<commit_message>
update codebase with comments and docstring
</commit_message>
<xml_diff>
--- a/DEC HACKATHON SLIDE (Team DataFlow).pptx
+++ b/DEC HACKATHON SLIDE (Team DataFlow).pptx
@@ -7487,6 +7487,70 @@
           </a:p>
         </p:txBody>
       </p:sp>
+      <p:sp>
+        <p:nvSpPr>
+          <p:cNvPr id="2" name="TextBox 1">
+            <a:extLst>
+              <a:ext uri="{FF2B5EF4-FFF2-40B4-BE49-F238E27FC236}">
+                <a16:creationId xmlns:a16="http://schemas.microsoft.com/office/drawing/2014/main" id="{3DF1D6E8-5E5C-2F8B-E131-B581163B197B}"/>
+              </a:ext>
+            </a:extLst>
+          </p:cNvPr>
+          <p:cNvSpPr txBox="1"/>
+          <p:nvPr/>
+        </p:nvSpPr>
+        <p:spPr>
+          <a:xfrm>
+            <a:off x="1964278" y="9332893"/>
+            <a:ext cx="14363023" cy="954107"/>
+          </a:xfrm>
+          <a:prstGeom prst="rect">
+            <a:avLst/>
+          </a:prstGeom>
+          <a:noFill/>
+        </p:spPr>
+        <p:txBody>
+          <a:bodyPr wrap="square">
+            <a:spAutoFit/>
+          </a:bodyPr>
+          <a:lstStyle/>
+          <a:p>
+            <a:pPr algn="ctr"/>
+            <a:r>
+              <a:rPr lang="en-US" sz="2800" i="1" dirty="0">
+                <a:solidFill>
+                  <a:schemeClr val="accent6">
+                    <a:lumMod val="75000"/>
+                  </a:schemeClr>
+                </a:solidFill>
+                <a:latin typeface="Canva Sans"/>
+                <a:ea typeface="Canva Sans"/>
+                <a:cs typeface="Canva Sans"/>
+                <a:sym typeface="Canva Sans"/>
+              </a:rPr>
+              <a:t>To fork the repo or replicate what we did:</a:t>
+            </a:r>
+          </a:p>
+          <a:p>
+            <a:pPr algn="ctr"/>
+            <a:r>
+              <a:rPr lang="en-US" sz="2800" i="1" dirty="0">
+                <a:solidFill>
+                  <a:schemeClr val="accent6">
+                    <a:lumMod val="75000"/>
+                  </a:schemeClr>
+                </a:solidFill>
+                <a:latin typeface="Canva Sans"/>
+                <a:ea typeface="Canva Sans"/>
+                <a:cs typeface="Canva Sans"/>
+                <a:sym typeface="Canva Sans"/>
+              </a:rPr>
+              <a:t>https://github.com/SammyGIS/dec-hackathon-team-1-solution</a:t>
+            </a:r>
+            <a:endParaRPr lang="en-US" sz="2800" dirty="0"/>
+          </a:p>
+        </p:txBody>
+      </p:sp>
     </p:spTree>
     <p:extLst>
       <p:ext uri="{BB962C8B-B14F-4D97-AF65-F5344CB8AC3E}">
@@ -8069,70 +8133,6 @@
           </a:p>
         </p:txBody>
       </p:sp>
-      <p:sp>
-        <p:nvSpPr>
-          <p:cNvPr id="14" name="TextBox 13">
-            <a:extLst>
-              <a:ext uri="{FF2B5EF4-FFF2-40B4-BE49-F238E27FC236}">
-                <a16:creationId xmlns:a16="http://schemas.microsoft.com/office/drawing/2014/main" id="{C366E1E1-AC16-45D6-1352-0789B74D4196}"/>
-              </a:ext>
-            </a:extLst>
-          </p:cNvPr>
-          <p:cNvSpPr txBox="1"/>
-          <p:nvPr/>
-        </p:nvSpPr>
-        <p:spPr>
-          <a:xfrm>
-            <a:off x="2563394" y="8513725"/>
-            <a:ext cx="14363023" cy="1200329"/>
-          </a:xfrm>
-          <a:prstGeom prst="rect">
-            <a:avLst/>
-          </a:prstGeom>
-          <a:noFill/>
-        </p:spPr>
-        <p:txBody>
-          <a:bodyPr wrap="square">
-            <a:spAutoFit/>
-          </a:bodyPr>
-          <a:lstStyle/>
-          <a:p>
-            <a:pPr algn="ctr"/>
-            <a:r>
-              <a:rPr lang="en-US" sz="3600" i="1" dirty="0">
-                <a:solidFill>
-                  <a:schemeClr val="accent6">
-                    <a:lumMod val="75000"/>
-                  </a:schemeClr>
-                </a:solidFill>
-                <a:latin typeface="Canva Sans"/>
-                <a:ea typeface="Canva Sans"/>
-                <a:cs typeface="Canva Sans"/>
-                <a:sym typeface="Canva Sans"/>
-              </a:rPr>
-              <a:t>To fork the repo or replicate what we did:</a:t>
-            </a:r>
-          </a:p>
-          <a:p>
-            <a:pPr algn="ctr"/>
-            <a:r>
-              <a:rPr lang="en-US" sz="3600" i="1" dirty="0">
-                <a:solidFill>
-                  <a:schemeClr val="accent6">
-                    <a:lumMod val="75000"/>
-                  </a:schemeClr>
-                </a:solidFill>
-                <a:latin typeface="Canva Sans"/>
-                <a:ea typeface="Canva Sans"/>
-                <a:cs typeface="Canva Sans"/>
-                <a:sym typeface="Canva Sans"/>
-              </a:rPr>
-              <a:t>https://github.com/SammyGIS/dec-hackathon-team-1-solution</a:t>
-            </a:r>
-            <a:endParaRPr lang="en-US" sz="3600" dirty="0"/>
-          </a:p>
-        </p:txBody>
-      </p:sp>
     </p:spTree>
   </p:cSld>
   <p:clrMapOvr>
@@ -8541,7 +8541,7 @@
         </p:nvSpPr>
         <p:spPr>
           <a:xfrm>
-            <a:off x="1028700" y="5065301"/>
+            <a:off x="1028700" y="5462392"/>
             <a:ext cx="7505700" cy="1107996"/>
           </a:xfrm>
           <a:prstGeom prst="rect">
@@ -8711,16 +8711,11 @@
           <a:prstGeom prst="ellipse">
             <a:avLst/>
           </a:prstGeom>
-          <a:blipFill>
-            <a:blip r:embed="rId8">
-              <a:extLst>
-                <a:ext uri="{96DAC541-7B7A-43D3-8B79-37D633B846F1}">
-                  <asvg:svgBlip xmlns:asvg="http://schemas.microsoft.com/office/drawing/2016/SVG/main" r:embed="rId9"/>
-                </a:ext>
-              </a:extLst>
-            </a:blip>
+          <a:blipFill dpi="0" rotWithShape="1">
+            <a:blip r:embed="rId8"/>
+            <a:srcRect/>
             <a:stretch>
-              <a:fillRect b="-11000"/>
+              <a:fillRect l="-21000" t="-1000" r="-20000" b="-32000"/>
             </a:stretch>
           </a:blipFill>
           <a:ln>
@@ -8861,8 +8856,8 @@
         </p:nvSpPr>
         <p:spPr>
           <a:xfrm>
-            <a:off x="10834846" y="9154828"/>
-            <a:ext cx="3101230" cy="400110"/>
+            <a:off x="10376754" y="9142056"/>
+            <a:ext cx="3818089" cy="400110"/>
           </a:xfrm>
           <a:prstGeom prst="rect">
             <a:avLst/>
@@ -8882,23 +8877,8 @@
                 </a:solidFill>
                 <a:latin typeface="Canva Sans" panose="020B0604020202020204" charset="0"/>
               </a:rPr>
-              <a:t>Hammed </a:t>
-            </a:r>
-            <a:r>
-              <a:rPr lang="en-US" sz="2000" b="1" dirty="0" err="1">
-                <a:solidFill>
-                  <a:schemeClr val="bg1"/>
-                </a:solidFill>
-                <a:latin typeface="Canva Sans" panose="020B0604020202020204" charset="0"/>
-              </a:rPr>
-              <a:t>Adegunjudade</a:t>
-            </a:r>
-            <a:endParaRPr lang="en-US" sz="2000" b="1" dirty="0">
-              <a:solidFill>
-                <a:schemeClr val="bg1"/>
-              </a:solidFill>
-              <a:latin typeface="Canva Sans" panose="020B0604020202020204" charset="0"/>
-            </a:endParaRPr>
+              <a:t>Hammed Akin AROGUNDADE</a:t>
+            </a:r>
           </a:p>
         </p:txBody>
       </p:sp>
@@ -8916,8 +8896,8 @@
         </p:nvSpPr>
         <p:spPr>
           <a:xfrm>
-            <a:off x="15502884" y="9113890"/>
-            <a:ext cx="2466688" cy="400110"/>
+            <a:off x="15083949" y="9142056"/>
+            <a:ext cx="2835735" cy="400110"/>
           </a:xfrm>
           <a:prstGeom prst="rect">
             <a:avLst/>
@@ -8946,123 +8926,72 @@
                 </a:solidFill>
                 <a:latin typeface="Canva Sans" panose="020B0604020202020204" charset="0"/>
               </a:rPr>
-              <a:t> Ahmed</a:t>
+              <a:t> Hammed</a:t>
             </a:r>
           </a:p>
         </p:txBody>
       </p:sp>
-      <p:pic>
-        <p:nvPicPr>
-          <p:cNvPr id="2050" name="Picture 2" descr="Hammed Akin AROGUNDADE. MNSE,MIAENG.">
+      <p:sp>
+        <p:nvSpPr>
+          <p:cNvPr id="9" name="Oval 8">
             <a:extLst>
               <a:ext uri="{FF2B5EF4-FFF2-40B4-BE49-F238E27FC236}">
-                <a16:creationId xmlns:a16="http://schemas.microsoft.com/office/drawing/2014/main" id="{9073014E-B232-F846-7DDD-CEB25D67820F}"/>
+                <a16:creationId xmlns:a16="http://schemas.microsoft.com/office/drawing/2014/main" id="{D5C1E11E-AE9D-3DE7-DDCC-B33F9C327DC8}"/>
               </a:ext>
             </a:extLst>
           </p:cNvPr>
-          <p:cNvPicPr>
-            <a:picLocks noChangeAspect="1" noChangeArrowheads="1"/>
-          </p:cNvPicPr>
+          <p:cNvSpPr/>
           <p:nvPr/>
-        </p:nvPicPr>
-        <p:blipFill>
-          <a:blip r:embed="rId10">
-            <a:extLst>
-              <a:ext uri="{28A0092B-C50C-407E-A947-70E740481C1C}">
-                <a14:useLocalDpi xmlns:a14="http://schemas.microsoft.com/office/drawing/2010/main" val="0"/>
-              </a:ext>
-            </a:extLst>
-          </a:blip>
-          <a:srcRect/>
-          <a:stretch>
-            <a:fillRect/>
-          </a:stretch>
-        </p:blipFill>
-        <p:spPr bwMode="auto">
+        </p:nvSpPr>
+        <p:spPr>
           <a:xfrm>
-            <a:off x="10896130" y="5940772"/>
-            <a:ext cx="3101230" cy="3101230"/>
+            <a:off x="14995559" y="5940772"/>
+            <a:ext cx="2667000" cy="2667592"/>
           </a:xfrm>
           <a:prstGeom prst="ellipse">
             <a:avLst/>
           </a:prstGeom>
-          <a:ln w="63500" cap="rnd">
+          <a:blipFill dpi="0" rotWithShape="1">
+            <a:blip r:embed="rId9"/>
+            <a:srcRect/>
+            <a:stretch>
+              <a:fillRect/>
+            </a:stretch>
+          </a:blipFill>
+          <a:ln>
             <a:solidFill>
-              <a:srgbClr val="333333"/>
+              <a:schemeClr val="accent1">
+                <a:shade val="15000"/>
+              </a:schemeClr>
             </a:solidFill>
           </a:ln>
-          <a:effectLst>
-            <a:outerShdw blurRad="381000" dist="292100" dir="5400000" sx="-80000" sy="-18000" rotWithShape="0">
-              <a:srgbClr val="000000">
-                <a:alpha val="22000"/>
-              </a:srgbClr>
-            </a:outerShdw>
-          </a:effectLst>
-          <a:scene3d>
-            <a:camera prst="orthographicFront"/>
-            <a:lightRig rig="contrasting" dir="t">
-              <a:rot lat="0" lon="0" rev="3000000"/>
-            </a:lightRig>
-          </a:scene3d>
-          <a:sp3d contourW="7620">
-            <a:bevelT w="95250" h="31750"/>
-            <a:contourClr>
-              <a:srgbClr val="333333"/>
-            </a:contourClr>
-          </a:sp3d>
-          <a:extLst>
-            <a:ext uri="{909E8E84-426E-40DD-AFC4-6F175D3DCCD1}">
-              <a14:hiddenFill xmlns:a14="http://schemas.microsoft.com/office/drawing/2010/main">
-                <a:solidFill>
-                  <a:srgbClr val="FFFFFF"/>
-                </a:solidFill>
-              </a14:hiddenFill>
-            </a:ext>
-          </a:extLst>
+          <a:effectLst/>
         </p:spPr>
-      </p:pic>
-      <p:pic>
-        <p:nvPicPr>
-          <p:cNvPr id="12" name="Picture 11">
-            <a:extLst>
-              <a:ext uri="{FF2B5EF4-FFF2-40B4-BE49-F238E27FC236}">
-                <a16:creationId xmlns:a16="http://schemas.microsoft.com/office/drawing/2014/main" id="{BE127472-C38A-41E7-07F6-CB2189E17607}"/>
-              </a:ext>
-            </a:extLst>
-          </p:cNvPr>
-          <p:cNvPicPr>
-            <a:picLocks noChangeAspect="1"/>
-          </p:cNvPicPr>
-          <p:nvPr/>
-        </p:nvPicPr>
-        <p:blipFill>
-          <a:blip r:embed="rId11">
-            <a:extLst>
-              <a:ext uri="{BEBA8EAE-BF5A-486C-A8C5-ECC9F3942E4B}">
-                <a14:imgProps xmlns:a14="http://schemas.microsoft.com/office/drawing/2010/main">
-                  <a14:imgLayer r:embed="rId12">
-                    <a14:imgEffect>
-                      <a14:backgroundRemoval t="10000" b="90000" l="10000" r="90000"/>
-                    </a14:imgEffect>
-                  </a14:imgLayer>
-                </a14:imgProps>
-              </a:ext>
-            </a:extLst>
-          </a:blip>
-          <a:stretch>
-            <a:fillRect/>
-          </a:stretch>
-        </p:blipFill>
-        <p:spPr>
-          <a:xfrm>
-            <a:off x="14401799" y="5491509"/>
-            <a:ext cx="4176159" cy="4022491"/>
-          </a:xfrm>
-          <a:prstGeom prst="rect">
-            <a:avLst/>
-          </a:prstGeom>
-        </p:spPr>
-      </p:pic>
+        <p:style>
+          <a:lnRef idx="2">
+            <a:schemeClr val="accent1">
+              <a:shade val="15000"/>
+            </a:schemeClr>
+          </a:lnRef>
+          <a:fillRef idx="1">
+            <a:schemeClr val="accent1"/>
+          </a:fillRef>
+          <a:effectRef idx="0">
+            <a:schemeClr val="accent1"/>
+          </a:effectRef>
+          <a:fontRef idx="minor">
+            <a:schemeClr val="lt1"/>
+          </a:fontRef>
+        </p:style>
+        <p:txBody>
+          <a:bodyPr rtlCol="0" anchor="ctr"/>
+          <a:lstStyle/>
+          <a:p>
+            <a:pPr algn="ctr"/>
+            <a:endParaRPr lang="en-US" dirty="0"/>
+          </a:p>
+        </p:txBody>
+      </p:sp>
     </p:spTree>
   </p:cSld>
   <p:clrMapOvr>
@@ -12268,10 +12197,10 @@
       </p:sp>
       <p:pic>
         <p:nvPicPr>
-          <p:cNvPr id="10" name="Picture 9" descr="A screenshot of a computer&#10;&#10;Description automatically generated">
+          <p:cNvPr id="12" name="Picture 11" descr="A screenshot of a computer&#10;&#10;Description automatically generated">
             <a:extLst>
               <a:ext uri="{FF2B5EF4-FFF2-40B4-BE49-F238E27FC236}">
-                <a16:creationId xmlns:a16="http://schemas.microsoft.com/office/drawing/2014/main" id="{4498743B-12A3-0431-5416-B4CAFDF05CAC}"/>
+                <a16:creationId xmlns:a16="http://schemas.microsoft.com/office/drawing/2014/main" id="{086EA6A0-D621-BF90-3106-7659B7C126BF}"/>
               </a:ext>
             </a:extLst>
           </p:cNvPr>
@@ -12294,8 +12223,8 @@
         </p:blipFill>
         <p:spPr>
           <a:xfrm>
-            <a:off x="818215" y="2643129"/>
-            <a:ext cx="8821381" cy="4486901"/>
+            <a:off x="9625418" y="2628036"/>
+            <a:ext cx="6857534" cy="4740769"/>
           </a:xfrm>
           <a:prstGeom prst="rect">
             <a:avLst/>
@@ -12304,10 +12233,10 @@
       </p:pic>
       <p:pic>
         <p:nvPicPr>
-          <p:cNvPr id="12" name="Picture 11" descr="A screenshot of a computer&#10;&#10;Description automatically generated">
+          <p:cNvPr id="14" name="Picture 13" descr="A screenshot of a computer&#10;&#10;Description automatically generated">
             <a:extLst>
               <a:ext uri="{FF2B5EF4-FFF2-40B4-BE49-F238E27FC236}">
-                <a16:creationId xmlns:a16="http://schemas.microsoft.com/office/drawing/2014/main" id="{086EA6A0-D621-BF90-3106-7659B7C126BF}"/>
+                <a16:creationId xmlns:a16="http://schemas.microsoft.com/office/drawing/2014/main" id="{BC92B290-7DEA-5FD2-9546-FC53BBE9ED17}"/>
               </a:ext>
             </a:extLst>
           </p:cNvPr>
@@ -12330,8 +12259,8 @@
         </p:blipFill>
         <p:spPr>
           <a:xfrm>
-            <a:off x="9982667" y="1403933"/>
-            <a:ext cx="6697010" cy="4629796"/>
+            <a:off x="670166" y="2628036"/>
+            <a:ext cx="6857534" cy="4094731"/>
           </a:xfrm>
           <a:prstGeom prst="rect">
             <a:avLst/>
@@ -12340,10 +12269,10 @@
       </p:pic>
       <p:pic>
         <p:nvPicPr>
-          <p:cNvPr id="14" name="Picture 13" descr="A screenshot of a computer&#10;&#10;Description automatically generated">
+          <p:cNvPr id="16" name="Picture 15" descr="A screenshot of a computer&#10;&#10;Description automatically generated">
             <a:extLst>
               <a:ext uri="{FF2B5EF4-FFF2-40B4-BE49-F238E27FC236}">
-                <a16:creationId xmlns:a16="http://schemas.microsoft.com/office/drawing/2014/main" id="{BC92B290-7DEA-5FD2-9546-FC53BBE9ED17}"/>
+                <a16:creationId xmlns:a16="http://schemas.microsoft.com/office/drawing/2014/main" id="{4C645A5F-36A4-F416-7C21-27A70E31DEC4}"/>
               </a:ext>
             </a:extLst>
           </p:cNvPr>
@@ -12366,8 +12295,8 @@
         </p:blipFill>
         <p:spPr>
           <a:xfrm>
-            <a:off x="9266622" y="4802859"/>
-            <a:ext cx="8583223" cy="5125165"/>
+            <a:off x="9625418" y="6211175"/>
+            <a:ext cx="7824381" cy="3937816"/>
           </a:xfrm>
           <a:prstGeom prst="rect">
             <a:avLst/>
@@ -12376,10 +12305,10 @@
       </p:pic>
       <p:pic>
         <p:nvPicPr>
-          <p:cNvPr id="16" name="Picture 15" descr="A screenshot of a computer&#10;&#10;Description automatically generated">
+          <p:cNvPr id="10" name="Picture 9" descr="A screenshot of a computer&#10;&#10;Description automatically generated">
             <a:extLst>
               <a:ext uri="{FF2B5EF4-FFF2-40B4-BE49-F238E27FC236}">
-                <a16:creationId xmlns:a16="http://schemas.microsoft.com/office/drawing/2014/main" id="{4C645A5F-36A4-F416-7C21-27A70E31DEC4}"/>
+                <a16:creationId xmlns:a16="http://schemas.microsoft.com/office/drawing/2014/main" id="{4498743B-12A3-0431-5416-B4CAFDF05CAC}"/>
               </a:ext>
             </a:extLst>
           </p:cNvPr>
@@ -12402,8 +12331,8 @@
         </p:blipFill>
         <p:spPr>
           <a:xfrm>
-            <a:off x="833321" y="5843529"/>
-            <a:ext cx="8726118" cy="4391638"/>
+            <a:off x="688755" y="5629826"/>
+            <a:ext cx="8050363" cy="4094731"/>
           </a:xfrm>
           <a:prstGeom prst="rect">
             <a:avLst/>

</xml_diff>